<commit_message>
Added and modified various things, check commit
</commit_message>
<xml_diff>
--- a/wiki/portfolios-explained/pptx/portfolios_explained.pptx
+++ b/wiki/portfolios-explained/pptx/portfolios_explained.pptx
@@ -105,6 +105,11 @@
       </a:defRPr>
     </a:lvl9pPr>
   </p:defaultTextStyle>
+  <p:extLst>
+    <p:ext uri="{EFAFB233-063F-42B5-8137-9DF3F51BA10A}">
+      <p15:sldGuideLst xmlns:p15="http://schemas.microsoft.com/office/powerpoint/2012/main"/>
+    </p:ext>
+  </p:extLst>
 </p:presentation>
 </file>
 
@@ -239,7 +244,7 @@
           <a:p>
             <a:fld id="{9B3BFFE0-FAB8-4CC6-99AD-920506F0B7E6}" type="datetimeFigureOut">
               <a:rPr lang="en-GB" smtClean="0"/>
-              <a:t>30/07/2016</a:t>
+              <a:t>29/08/2016</a:t>
             </a:fld>
             <a:endParaRPr lang="en-GB"/>
           </a:p>
@@ -409,7 +414,7 @@
           <a:p>
             <a:fld id="{9B3BFFE0-FAB8-4CC6-99AD-920506F0B7E6}" type="datetimeFigureOut">
               <a:rPr lang="en-GB" smtClean="0"/>
-              <a:t>30/07/2016</a:t>
+              <a:t>29/08/2016</a:t>
             </a:fld>
             <a:endParaRPr lang="en-GB"/>
           </a:p>
@@ -589,7 +594,7 @@
           <a:p>
             <a:fld id="{9B3BFFE0-FAB8-4CC6-99AD-920506F0B7E6}" type="datetimeFigureOut">
               <a:rPr lang="en-GB" smtClean="0"/>
-              <a:t>30/07/2016</a:t>
+              <a:t>29/08/2016</a:t>
             </a:fld>
             <a:endParaRPr lang="en-GB"/>
           </a:p>
@@ -759,7 +764,7 @@
           <a:p>
             <a:fld id="{9B3BFFE0-FAB8-4CC6-99AD-920506F0B7E6}" type="datetimeFigureOut">
               <a:rPr lang="en-GB" smtClean="0"/>
-              <a:t>30/07/2016</a:t>
+              <a:t>29/08/2016</a:t>
             </a:fld>
             <a:endParaRPr lang="en-GB"/>
           </a:p>
@@ -1005,7 +1010,7 @@
           <a:p>
             <a:fld id="{9B3BFFE0-FAB8-4CC6-99AD-920506F0B7E6}" type="datetimeFigureOut">
               <a:rPr lang="en-GB" smtClean="0"/>
-              <a:t>30/07/2016</a:t>
+              <a:t>29/08/2016</a:t>
             </a:fld>
             <a:endParaRPr lang="en-GB"/>
           </a:p>
@@ -1237,7 +1242,7 @@
           <a:p>
             <a:fld id="{9B3BFFE0-FAB8-4CC6-99AD-920506F0B7E6}" type="datetimeFigureOut">
               <a:rPr lang="en-GB" smtClean="0"/>
-              <a:t>30/07/2016</a:t>
+              <a:t>29/08/2016</a:t>
             </a:fld>
             <a:endParaRPr lang="en-GB"/>
           </a:p>
@@ -1604,7 +1609,7 @@
           <a:p>
             <a:fld id="{9B3BFFE0-FAB8-4CC6-99AD-920506F0B7E6}" type="datetimeFigureOut">
               <a:rPr lang="en-GB" smtClean="0"/>
-              <a:t>30/07/2016</a:t>
+              <a:t>29/08/2016</a:t>
             </a:fld>
             <a:endParaRPr lang="en-GB"/>
           </a:p>
@@ -1722,7 +1727,7 @@
           <a:p>
             <a:fld id="{9B3BFFE0-FAB8-4CC6-99AD-920506F0B7E6}" type="datetimeFigureOut">
               <a:rPr lang="en-GB" smtClean="0"/>
-              <a:t>30/07/2016</a:t>
+              <a:t>29/08/2016</a:t>
             </a:fld>
             <a:endParaRPr lang="en-GB"/>
           </a:p>
@@ -1817,7 +1822,7 @@
           <a:p>
             <a:fld id="{9B3BFFE0-FAB8-4CC6-99AD-920506F0B7E6}" type="datetimeFigureOut">
               <a:rPr lang="en-GB" smtClean="0"/>
-              <a:t>30/07/2016</a:t>
+              <a:t>29/08/2016</a:t>
             </a:fld>
             <a:endParaRPr lang="en-GB"/>
           </a:p>
@@ -2094,7 +2099,7 @@
           <a:p>
             <a:fld id="{9B3BFFE0-FAB8-4CC6-99AD-920506F0B7E6}" type="datetimeFigureOut">
               <a:rPr lang="en-GB" smtClean="0"/>
-              <a:t>30/07/2016</a:t>
+              <a:t>29/08/2016</a:t>
             </a:fld>
             <a:endParaRPr lang="en-GB"/>
           </a:p>
@@ -2347,7 +2352,7 @@
           <a:p>
             <a:fld id="{9B3BFFE0-FAB8-4CC6-99AD-920506F0B7E6}" type="datetimeFigureOut">
               <a:rPr lang="en-GB" smtClean="0"/>
-              <a:t>30/07/2016</a:t>
+              <a:t>29/08/2016</a:t>
             </a:fld>
             <a:endParaRPr lang="en-GB"/>
           </a:p>
@@ -2560,7 +2565,7 @@
           <a:p>
             <a:fld id="{9B3BFFE0-FAB8-4CC6-99AD-920506F0B7E6}" type="datetimeFigureOut">
               <a:rPr lang="en-GB" smtClean="0"/>
-              <a:t>30/07/2016</a:t>
+              <a:t>29/08/2016</a:t>
             </a:fld>
             <a:endParaRPr lang="en-GB"/>
           </a:p>
@@ -2973,10 +2978,10 @@
         </p:nvGrpSpPr>
         <p:grpSpPr>
           <a:xfrm>
-            <a:off x="2766000" y="2055805"/>
-            <a:ext cx="6660000" cy="2746390"/>
-            <a:chOff x="333152" y="386671"/>
-            <a:chExt cx="6660000" cy="2746390"/>
+            <a:off x="2766000" y="2587902"/>
+            <a:ext cx="6660000" cy="1679301"/>
+            <a:chOff x="333152" y="1453759"/>
+            <a:chExt cx="6660000" cy="1679301"/>
           </a:xfrm>
         </p:grpSpPr>
         <p:sp>
@@ -2987,8 +2992,8 @@
           </p:nvSpPr>
           <p:spPr>
             <a:xfrm>
-              <a:off x="333152" y="386673"/>
-              <a:ext cx="6660000" cy="2746388"/>
+              <a:off x="333152" y="1456655"/>
+              <a:ext cx="6660000" cy="1676405"/>
             </a:xfrm>
             <a:prstGeom prst="rect">
               <a:avLst/>
@@ -3035,7 +3040,7 @@
           </p:nvSpPr>
           <p:spPr>
             <a:xfrm>
-              <a:off x="2324986" y="386671"/>
+              <a:off x="2324986" y="1456656"/>
               <a:ext cx="4668166" cy="307777"/>
             </a:xfrm>
             <a:prstGeom prst="rect">
@@ -3077,7 +3082,7 @@
           </p:nvSpPr>
           <p:spPr>
             <a:xfrm>
-              <a:off x="333152" y="386671"/>
+              <a:off x="333152" y="1453759"/>
               <a:ext cx="1991834" cy="307777"/>
             </a:xfrm>
             <a:prstGeom prst="rect">
@@ -3103,82 +3108,6 @@
                   <a:cs typeface="Segoe UI" panose="020B0502040204020203" pitchFamily="34" charset="0"/>
                 </a:rPr>
                 <a:t>Current Grant Portfolio</a:t>
-              </a:r>
-            </a:p>
-          </p:txBody>
-        </p:sp>
-        <p:sp>
-          <p:nvSpPr>
-            <p:cNvPr id="15" name="TextBox 14"/>
-            <p:cNvSpPr txBox="1"/>
-            <p:nvPr/>
-          </p:nvSpPr>
-          <p:spPr>
-            <a:xfrm>
-              <a:off x="2983669" y="835783"/>
-              <a:ext cx="1358961" cy="307777"/>
-            </a:xfrm>
-            <a:prstGeom prst="rect">
-              <a:avLst/>
-            </a:prstGeom>
-            <a:noFill/>
-            <a:ln w="12700">
-              <a:solidFill>
-                <a:schemeClr val="tx1"/>
-              </a:solidFill>
-            </a:ln>
-          </p:spPr>
-          <p:txBody>
-            <a:bodyPr wrap="square" rtlCol="0" anchor="ctr">
-              <a:spAutoFit/>
-            </a:bodyPr>
-            <a:lstStyle/>
-            <a:p>
-              <a:pPr algn="ctr"/>
-              <a:r>
-                <a:rPr lang="en-GB" sz="1400" dirty="0">
-                  <a:latin typeface="Segoe UI" panose="020B0502040204020203" pitchFamily="34" charset="0"/>
-                  <a:cs typeface="Segoe UI" panose="020B0502040204020203" pitchFamily="34" charset="0"/>
-                </a:rPr>
-                <a:t>Research Topic</a:t>
-              </a:r>
-            </a:p>
-          </p:txBody>
-        </p:sp>
-        <p:sp>
-          <p:nvSpPr>
-            <p:cNvPr id="57" name="TextBox 56"/>
-            <p:cNvSpPr txBox="1"/>
-            <p:nvPr/>
-          </p:nvSpPr>
-          <p:spPr>
-            <a:xfrm>
-              <a:off x="1980665" y="1375021"/>
-              <a:ext cx="3364971" cy="307777"/>
-            </a:xfrm>
-            <a:prstGeom prst="rect">
-              <a:avLst/>
-            </a:prstGeom>
-            <a:noFill/>
-            <a:ln w="12700">
-              <a:solidFill>
-                <a:schemeClr val="tx1"/>
-              </a:solidFill>
-            </a:ln>
-          </p:spPr>
-          <p:txBody>
-            <a:bodyPr wrap="square" rtlCol="0" anchor="ctr">
-              <a:spAutoFit/>
-            </a:bodyPr>
-            <a:lstStyle/>
-            <a:p>
-              <a:pPr algn="ctr"/>
-              <a:r>
-                <a:rPr lang="en-GB" sz="1400" dirty="0">
-                  <a:latin typeface="Segoe UI" panose="020B0502040204020203" pitchFamily="34" charset="0"/>
-                  <a:cs typeface="Segoe UI" panose="020B0502040204020203" pitchFamily="34" charset="0"/>
-                </a:rPr>
-                <a:t>Research Topic e.g. Algebra &amp; Geometry</a:t>
               </a:r>
             </a:p>
           </p:txBody>
@@ -3350,86 +3279,6 @@
             </p:txBody>
           </p:sp>
         </p:grpSp>
-        <p:cxnSp>
-          <p:nvCxnSpPr>
-            <p:cNvPr id="80" name="Straight Connector 79"/>
-            <p:cNvCxnSpPr>
-              <a:stCxn id="15" idx="2"/>
-              <a:endCxn id="57" idx="0"/>
-            </p:cNvCxnSpPr>
-            <p:nvPr/>
-          </p:nvCxnSpPr>
-          <p:spPr>
-            <a:xfrm rot="16200000" flipH="1">
-              <a:off x="3547420" y="1259289"/>
-              <a:ext cx="231461" cy="1"/>
-            </a:xfrm>
-            <a:prstGeom prst="bentConnector3">
-              <a:avLst>
-                <a:gd name="adj1" fmla="val 50000"/>
-              </a:avLst>
-            </a:prstGeom>
-            <a:ln w="12700">
-              <a:solidFill>
-                <a:schemeClr val="tx1"/>
-              </a:solidFill>
-            </a:ln>
-          </p:spPr>
-          <p:style>
-            <a:lnRef idx="1">
-              <a:schemeClr val="accent1"/>
-            </a:lnRef>
-            <a:fillRef idx="0">
-              <a:schemeClr val="accent1"/>
-            </a:fillRef>
-            <a:effectRef idx="0">
-              <a:schemeClr val="accent1"/>
-            </a:effectRef>
-            <a:fontRef idx="minor">
-              <a:schemeClr val="tx1"/>
-            </a:fontRef>
-          </p:style>
-        </p:cxnSp>
-        <p:cxnSp>
-          <p:nvCxnSpPr>
-            <p:cNvPr id="84" name="Straight Connector 83"/>
-            <p:cNvCxnSpPr>
-              <a:stCxn id="57" idx="2"/>
-              <a:endCxn id="63" idx="0"/>
-            </p:cNvCxnSpPr>
-            <p:nvPr/>
-          </p:nvCxnSpPr>
-          <p:spPr>
-            <a:xfrm rot="5400000">
-              <a:off x="3548287" y="1797662"/>
-              <a:ext cx="229729" cy="1"/>
-            </a:xfrm>
-            <a:prstGeom prst="bentConnector3">
-              <a:avLst>
-                <a:gd name="adj1" fmla="val 50000"/>
-              </a:avLst>
-            </a:prstGeom>
-            <a:ln w="12700">
-              <a:solidFill>
-                <a:schemeClr val="tx1"/>
-              </a:solidFill>
-            </a:ln>
-          </p:spPr>
-          <p:style>
-            <a:lnRef idx="1">
-              <a:schemeClr val="accent1"/>
-            </a:lnRef>
-            <a:fillRef idx="0">
-              <a:schemeClr val="accent1"/>
-            </a:fillRef>
-            <a:effectRef idx="0">
-              <a:schemeClr val="accent1"/>
-            </a:effectRef>
-            <a:fontRef idx="minor">
-              <a:schemeClr val="tx1"/>
-            </a:fontRef>
-          </p:style>
-        </p:cxnSp>
         <p:cxnSp>
           <p:nvCxnSpPr>
             <p:cNvPr id="90" name="Straight Connector 89"/>

</xml_diff>